<commit_message>
testing again to get AWS running
</commit_message>
<xml_diff>
--- a/presentation_ErinWolpert.pptx
+++ b/presentation_ErinWolpert.pptx
@@ -14,7 +14,7 @@
     <p:sldId id="261" r:id="rId5"/>
     <p:sldId id="259" r:id="rId6"/>
     <p:sldId id="262" r:id="rId7"/>
-    <p:sldId id="264" r:id="rId8"/>
+    <p:sldId id="266" r:id="rId8"/>
   </p:sldIdLst>
   <p:sldSz cx="9144000" cy="6858000" type="screen4x3"/>
   <p:notesSz cx="6858000" cy="9144000"/>
@@ -7080,7 +7080,7 @@
           <a:p>
             <a:fld id="{386D659E-1874-3C41-AE75-8A6B8D36F891}" type="datetimeFigureOut">
               <a:rPr lang="en-US" smtClean="0"/>
-              <a:t>5/1/16</a:t>
+              <a:t>5/3/16</a:t>
             </a:fld>
             <a:endParaRPr lang="en-US"/>
           </a:p>
@@ -7637,7 +7637,7 @@
             <a:fld id="{7D0065BE-0657-4A47-90AD-C21C55E16B19}" type="datetime4">
               <a:rPr lang="en-US" smtClean="0"/>
               <a:pPr/>
-              <a:t>May 1, 2016</a:t>
+              <a:t>May 3, 2016</a:t>
             </a:fld>
             <a:endParaRPr lang="en-US"/>
           </a:p>
@@ -7804,7 +7804,7 @@
             <a:fld id="{A16C3AA4-67BE-44F7-809A-3582401494AF}" type="datetime4">
               <a:rPr lang="en-US" smtClean="0"/>
               <a:pPr/>
-              <a:t>May 1, 2016</a:t>
+              <a:t>May 3, 2016</a:t>
             </a:fld>
             <a:endParaRPr lang="en-US"/>
           </a:p>
@@ -7981,7 +7981,7 @@
             <a:fld id="{25172EEB-1769-4776-AD69-E7C1260563EB}" type="datetime4">
               <a:rPr lang="en-US" smtClean="0"/>
               <a:pPr/>
-              <a:t>May 1, 2016</a:t>
+              <a:t>May 3, 2016</a:t>
             </a:fld>
             <a:endParaRPr lang="en-US"/>
           </a:p>
@@ -8166,7 +8166,7 @@
             <a:fld id="{D47BB8AF-C16A-4836-A92D-61834B5F0BA5}" type="datetime4">
               <a:rPr lang="en-US" smtClean="0"/>
               <a:pPr/>
-              <a:t>May 1, 2016</a:t>
+              <a:t>May 3, 2016</a:t>
             </a:fld>
             <a:endParaRPr lang="en-US"/>
           </a:p>
@@ -8430,7 +8430,7 @@
             <a:fld id="{647D2193-4505-4A75-99BB-880C6989A757}" type="datetime4">
               <a:rPr lang="en-US" smtClean="0"/>
               <a:pPr/>
-              <a:t>May 1, 2016</a:t>
+              <a:t>May 3, 2016</a:t>
             </a:fld>
             <a:endParaRPr lang="en-US"/>
           </a:p>
@@ -8780,7 +8780,7 @@
             <a:fld id="{113A18F4-33C3-445B-924C-31108C51719C}" type="datetime4">
               <a:rPr lang="en-US" smtClean="0"/>
               <a:pPr/>
-              <a:t>May 1, 2016</a:t>
+              <a:t>May 3, 2016</a:t>
             </a:fld>
             <a:endParaRPr lang="en-US"/>
           </a:p>
@@ -9090,7 +9090,7 @@
             <a:fld id="{3AF7543A-E259-478F-9E0D-57BA40E442B7}" type="datetime4">
               <a:rPr lang="en-US" smtClean="0"/>
               <a:pPr/>
-              <a:t>May 1, 2016</a:t>
+              <a:t>May 3, 2016</a:t>
             </a:fld>
             <a:endParaRPr lang="en-US"/>
           </a:p>
@@ -9319,7 +9319,7 @@
             <a:fld id="{1EFB012D-77A1-44B0-BB26-329BA1EE55C9}" type="datetime4">
               <a:rPr lang="en-US" smtClean="0"/>
               <a:pPr/>
-              <a:t>May 1, 2016</a:t>
+              <a:t>May 3, 2016</a:t>
             </a:fld>
             <a:endParaRPr lang="en-US"/>
           </a:p>
@@ -9411,7 +9411,7 @@
             <a:fld id="{94B7499E-3031-413E-B01E-B94970708CAA}" type="datetime4">
               <a:rPr lang="en-US" smtClean="0"/>
               <a:pPr/>
-              <a:t>May 1, 2016</a:t>
+              <a:t>May 3, 2016</a:t>
             </a:fld>
             <a:endParaRPr lang="en-US"/>
           </a:p>
@@ -9701,7 +9701,7 @@
             <a:fld id="{DC7EAB0C-2220-4D0E-A0DD-DB7FA0F742F4}" type="datetime4">
               <a:rPr lang="en-US" smtClean="0"/>
               <a:pPr/>
-              <a:t>May 1, 2016</a:t>
+              <a:t>May 3, 2016</a:t>
             </a:fld>
             <a:endParaRPr lang="en-US"/>
           </a:p>
@@ -9972,7 +9972,7 @@
             <a:fld id="{E3416D63-31BF-4B94-B6C5-E20B2C63F515}" type="datetime4">
               <a:rPr lang="en-US" smtClean="0"/>
               <a:pPr/>
-              <a:t>May 1, 2016</a:t>
+              <a:t>May 3, 2016</a:t>
             </a:fld>
             <a:endParaRPr lang="en-US"/>
           </a:p>
@@ -10184,7 +10184,7 @@
             <a:fld id="{62B1B13E-D5AF-485E-81A1-82A140076526}" type="datetime4">
               <a:rPr lang="en-US" smtClean="0"/>
               <a:pPr/>
-              <a:t>May 1, 2016</a:t>
+              <a:t>May 3, 2016</a:t>
             </a:fld>
             <a:endParaRPr lang="en-US" dirty="0"/>
           </a:p>
@@ -10753,7 +10753,6 @@
               <a:rPr lang="en-US" sz="4400" dirty="0"/>
               <a:t>Science</a:t>
             </a:r>
-            <a:endParaRPr lang="en-US" sz="4400" dirty="0"/>
           </a:p>
         </p:txBody>
       </p:sp>
@@ -10775,16 +10774,16 @@
         </p:spPr>
         <p:txBody>
           <a:bodyPr>
-            <a:normAutofit fontScale="77500" lnSpcReduction="20000"/>
+            <a:noAutofit/>
           </a:bodyPr>
           <a:lstStyle/>
           <a:p>
             <a:pPr algn="l"/>
             <a:r>
-              <a:rPr lang="en-US" dirty="0" smtClean="0"/>
+              <a:rPr lang="en-US" sz="2800" dirty="0" smtClean="0"/>
               <a:t>Erin Wolpert</a:t>
             </a:r>
-            <a:endParaRPr lang="en-US" dirty="0"/>
+            <a:endParaRPr lang="en-US" sz="2800" dirty="0"/>
           </a:p>
         </p:txBody>
       </p:sp>
@@ -10869,32 +10868,57 @@
           <a:lstStyle/>
           <a:p>
             <a:r>
-              <a:rPr lang="en-US" dirty="0" smtClean="0"/>
-              <a:t>Personality Trait Theory</a:t>
+              <a:rPr lang="en-US" sz="2800" dirty="0" smtClean="0"/>
+              <a:t>Personality Trait </a:t>
+            </a:r>
+            <a:r>
+              <a:rPr lang="en-US" sz="2800" dirty="0" smtClean="0"/>
+              <a:t>Theory</a:t>
+            </a:r>
+          </a:p>
+          <a:p>
+            <a:endParaRPr lang="en-US" sz="2800" dirty="0"/>
+          </a:p>
+          <a:p>
+            <a:r>
+              <a:rPr lang="en-US" sz="2800" dirty="0" smtClean="0"/>
+              <a:t>Dataset </a:t>
+            </a:r>
+            <a:endParaRPr lang="en-US" sz="2800" dirty="0" smtClean="0"/>
+          </a:p>
+          <a:p>
+            <a:pPr lvl="1"/>
+            <a:r>
+              <a:rPr lang="en-US" sz="2000" dirty="0" smtClean="0"/>
+              <a:t>50K </a:t>
+            </a:r>
+            <a:r>
+              <a:rPr lang="en-US" sz="2000" dirty="0" smtClean="0"/>
+              <a:t>global </a:t>
+            </a:r>
+            <a:r>
+              <a:rPr lang="en-US" sz="2000" dirty="0" smtClean="0"/>
+              <a:t>respondents</a:t>
+            </a:r>
+          </a:p>
+          <a:p>
+            <a:pPr lvl="1"/>
+            <a:r>
+              <a:rPr lang="en-US" sz="2000" dirty="0" smtClean="0"/>
+              <a:t>163 questions</a:t>
+            </a:r>
+          </a:p>
+          <a:p>
+            <a:pPr lvl="1"/>
+            <a:r>
+              <a:rPr lang="en-US" sz="2000" dirty="0" smtClean="0"/>
+              <a:t>Scale 1-5 (strongly disagree to strongly agree)</a:t>
             </a:r>
           </a:p>
           <a:p>
             <a:pPr marL="0" indent="0">
               <a:buNone/>
             </a:pPr>
-            <a:endParaRPr lang="en-US" dirty="0" smtClean="0"/>
-          </a:p>
-          <a:p>
-            <a:r>
-              <a:rPr lang="en-US" dirty="0" smtClean="0"/>
-              <a:t>Big Five</a:t>
-            </a:r>
-          </a:p>
-          <a:p>
-            <a:endParaRPr lang="en-US" dirty="0"/>
-          </a:p>
-          <a:p>
-            <a:r>
-              <a:rPr lang="en-US" dirty="0" smtClean="0"/>
-              <a:t>Dataset of 50K global respondents</a:t>
-            </a:r>
-          </a:p>
-          <a:p>
             <a:endParaRPr lang="en-US" dirty="0"/>
           </a:p>
           <a:p>
@@ -10989,11 +11013,11 @@
           <a:p>
             <a:r>
               <a:rPr lang="en-US" b="1" dirty="0" smtClean="0"/>
-              <a:t>Topic </a:t>
+              <a:t>Trait 1</a:t>
             </a:r>
             <a:r>
               <a:rPr lang="en-US" b="1" dirty="0"/>
-              <a:t>1: </a:t>
+              <a:t>: </a:t>
             </a:r>
             <a:r>
               <a:rPr lang="en-US" dirty="0"/>
@@ -11008,7 +11032,7 @@
           <a:p>
             <a:r>
               <a:rPr lang="en-US" b="1" dirty="0" smtClean="0"/>
-              <a:t>Topic </a:t>
+              <a:t>Trait </a:t>
             </a:r>
             <a:r>
               <a:rPr lang="en-US" b="1" dirty="0"/>
@@ -11027,7 +11051,7 @@
           <a:p>
             <a:r>
               <a:rPr lang="en-US" b="1" dirty="0" smtClean="0"/>
-              <a:t>Topic </a:t>
+              <a:t>Trait </a:t>
             </a:r>
             <a:r>
               <a:rPr lang="en-US" b="1" dirty="0"/>
@@ -11046,7 +11070,7 @@
           <a:p>
             <a:r>
               <a:rPr lang="en-US" b="1" dirty="0" smtClean="0"/>
-              <a:t>Topic </a:t>
+              <a:t>Trait </a:t>
             </a:r>
             <a:r>
               <a:rPr lang="en-US" b="1" dirty="0"/>
@@ -11064,7 +11088,7 @@
           <a:p>
             <a:r>
               <a:rPr lang="en-US" b="1" dirty="0" smtClean="0"/>
-              <a:t>Topic </a:t>
+              <a:t>Trait </a:t>
             </a:r>
             <a:r>
               <a:rPr lang="en-US" b="1" dirty="0"/>
@@ -11090,11 +11114,11 @@
           <a:p>
             <a:r>
               <a:rPr lang="en-US" b="1" dirty="0" smtClean="0"/>
-              <a:t>Topic </a:t>
+              <a:t>Trait 6</a:t>
             </a:r>
             <a:r>
               <a:rPr lang="en-US" b="1" dirty="0"/>
-              <a:t>6: </a:t>
+              <a:t>: </a:t>
             </a:r>
             <a:r>
               <a:rPr lang="en-US" dirty="0"/>
@@ -11109,7 +11133,7 @@
           <a:p>
             <a:r>
               <a:rPr lang="en-US" b="1" dirty="0" smtClean="0"/>
-              <a:t>Topic </a:t>
+              <a:t>Trait </a:t>
             </a:r>
             <a:r>
               <a:rPr lang="en-US" b="1" dirty="0"/>
@@ -11123,7 +11147,7 @@
           <a:p>
             <a:r>
               <a:rPr lang="en-US" b="1" dirty="0" smtClean="0"/>
-              <a:t>Topic </a:t>
+              <a:t>Trait </a:t>
             </a:r>
             <a:r>
               <a:rPr lang="en-US" b="1" dirty="0"/>
@@ -11176,7 +11200,7 @@
       </p:grpSpPr>
       <p:pic>
         <p:nvPicPr>
-          <p:cNvPr id="6" name="Content Placeholder 5" descr="Factor 4- Breaks Rules - Judgemental.png"/>
+          <p:cNvPr id="3" name="Content Placeholder 2" descr="Factor 5- Angry - Judgmental - Dislikes Complex Ideas and Art.png"/>
           <p:cNvPicPr>
             <a:picLocks noGrp="1" noChangeAspect="1"/>
           </p:cNvPicPr>
@@ -11184,7 +11208,7 @@
             <p:ph idx="1"/>
           </p:nvPr>
         </p:nvPicPr>
-        <p:blipFill rotWithShape="1">
+        <p:blipFill>
           <a:blip r:embed="rId3">
             <a:extLst>
               <a:ext uri="{28A0092B-C50C-407E-A947-70E740481C1C}">
@@ -11192,13 +11216,15 @@
               </a:ext>
             </a:extLst>
           </a:blip>
-          <a:srcRect l="6911" r="677"/>
-          <a:stretch/>
+          <a:srcRect l="677" r="677"/>
+          <a:stretch>
+            <a:fillRect/>
+          </a:stretch>
         </p:blipFill>
         <p:spPr>
           <a:xfrm>
-            <a:off x="179463" y="828345"/>
-            <a:ext cx="8812684" cy="5173567"/>
+            <a:off x="179462" y="945432"/>
+            <a:ext cx="8867903" cy="4877005"/>
           </a:xfrm>
         </p:spPr>
       </p:pic>
@@ -11241,7 +11267,7 @@
       </p:grpSpPr>
       <p:pic>
         <p:nvPicPr>
-          <p:cNvPr id="8" name="Content Placeholder 7" descr="age4.png"/>
+          <p:cNvPr id="7" name="Content Placeholder 6" descr="Factor 4-Age.png"/>
           <p:cNvPicPr>
             <a:picLocks noGrp="1" noChangeAspect="1"/>
           </p:cNvPicPr>
@@ -11257,15 +11283,15 @@
               </a:ext>
             </a:extLst>
           </a:blip>
-          <a:srcRect l="-37025" r="-37025"/>
+          <a:srcRect l="3924" r="3924"/>
           <a:stretch>
             <a:fillRect/>
           </a:stretch>
         </p:blipFill>
         <p:spPr>
           <a:xfrm>
-            <a:off x="-2081829" y="147510"/>
-            <a:ext cx="13487841" cy="6420000"/>
+            <a:off x="165658" y="1050362"/>
+            <a:ext cx="8978342" cy="4937743"/>
           </a:xfrm>
         </p:spPr>
       </p:pic>
@@ -11316,7 +11342,7 @@
             <p:ph idx="1"/>
             <p:extLst>
               <p:ext uri="{D42A27DB-BD31-4B8C-83A1-F6EECF244321}">
-                <p14:modId xmlns:p14="http://schemas.microsoft.com/office/powerpoint/2010/main" val="2421908379"/>
+                <p14:modId xmlns:p14="http://schemas.microsoft.com/office/powerpoint/2010/main" val="3711439156"/>
               </p:ext>
             </p:extLst>
           </p:nvPr>
@@ -11462,15 +11488,12 @@
                       </a:pPr>
                       <a:r>
                         <a:rPr lang="en-US" baseline="0" dirty="0" smtClean="0"/>
-                        <a:t>Openness to Experience</a:t>
+                        <a:t>Openness to </a:t>
                       </a:r>
-                    </a:p>
-                    <a:p>
-                      <a:pPr marL="0" indent="0">
-                        <a:buFontTx/>
-                        <a:buNone/>
-                      </a:pPr>
-                      <a:endParaRPr lang="en-US" baseline="0" dirty="0" smtClean="0"/>
+                      <a:r>
+                        <a:rPr lang="en-US" baseline="0" dirty="0" smtClean="0"/>
+                        <a:t>Experience</a:t>
+                      </a:r>
                     </a:p>
                     <a:p>
                       <a:pPr marL="0" indent="0">
@@ -11599,15 +11622,7 @@
                       </a:r>
                       <a:r>
                         <a:rPr lang="en-US" baseline="0" dirty="0" smtClean="0"/>
-                        <a:t> </a:t>
-                      </a:r>
-                      <a:r>
-                        <a:rPr lang="en-US" baseline="0" smtClean="0"/>
-                        <a:t>New </a:t>
-                      </a:r>
-                      <a:r>
-                        <a:rPr lang="en-US" baseline="0" smtClean="0"/>
-                        <a:t>Ideas</a:t>
+                        <a:t> New Ideas</a:t>
                       </a:r>
                     </a:p>
                     <a:p>
@@ -11793,8 +11808,8 @@
         </p:nvSpPr>
         <p:spPr>
           <a:xfrm>
-            <a:off x="457199" y="2995845"/>
-            <a:ext cx="8584989" cy="1600200"/>
+            <a:off x="457200" y="1379308"/>
+            <a:ext cx="8229600" cy="1600200"/>
           </a:xfrm>
         </p:spPr>
         <p:txBody>
@@ -11803,34 +11818,49 @@
           <a:p>
             <a:r>
               <a:rPr lang="en-US" dirty="0" smtClean="0"/>
-              <a:t/>
+              <a:t>Erin Wolpert</a:t>
             </a:r>
-            <a:br>
-              <a:rPr lang="en-US" dirty="0" smtClean="0"/>
-            </a:br>
+            <a:endParaRPr lang="en-US" dirty="0"/>
+          </a:p>
+        </p:txBody>
+      </p:sp>
+      <p:sp>
+        <p:nvSpPr>
+          <p:cNvPr id="3" name="Content Placeholder 2"/>
+          <p:cNvSpPr>
+            <a:spLocks noGrp="1"/>
+          </p:cNvSpPr>
+          <p:nvPr>
+            <p:ph idx="1"/>
+          </p:nvPr>
+        </p:nvSpPr>
+        <p:spPr>
+          <a:xfrm>
+            <a:off x="457200" y="3546809"/>
+            <a:ext cx="8229600" cy="2210183"/>
+          </a:xfrm>
+        </p:spPr>
+        <p:txBody>
+          <a:bodyPr>
+            <a:normAutofit/>
+          </a:bodyPr>
+          <a:lstStyle/>
+          <a:p>
+            <a:pPr marL="0" indent="0" algn="ctr">
+              <a:buNone/>
+            </a:pPr>
             <a:r>
-              <a:rPr lang="en-US" dirty="0" smtClean="0"/>
-              <a:t>		</a:t>
-            </a:r>
-            <a:r>
-              <a:rPr lang="en-US" dirty="0" err="1" smtClean="0"/>
+              <a:rPr lang="en-US" sz="4000" dirty="0" err="1" smtClean="0"/>
               <a:t>personalitydatascience.com</a:t>
             </a:r>
-            <a:r>
-              <a:rPr lang="en-US" dirty="0" smtClean="0"/>
-              <a:t/>
-            </a:r>
-            <a:br>
-              <a:rPr lang="en-US" dirty="0" smtClean="0"/>
-            </a:br>
-            <a:endParaRPr lang="en-US" dirty="0"/>
+            <a:endParaRPr lang="en-US" sz="4000" dirty="0"/>
           </a:p>
         </p:txBody>
       </p:sp>
     </p:spTree>
     <p:extLst>
       <p:ext uri="{BB962C8B-B14F-4D97-AF65-F5344CB8AC3E}">
-        <p14:creationId xmlns:p14="http://schemas.microsoft.com/office/powerpoint/2010/main" val="1295997012"/>
+        <p14:creationId xmlns:p14="http://schemas.microsoft.com/office/powerpoint/2010/main" val="3707266458"/>
       </p:ext>
     </p:extLst>
   </p:cSld>

</xml_diff>